<commit_message>
Cambio menor en la presentación
</commit_message>
<xml_diff>
--- a/PRESENTACIONES/Presentacion de Proyecto_WUKY.pptx
+++ b/PRESENTACIONES/Presentacion de Proyecto_WUKY.pptx
@@ -24551,6 +24551,42 @@
           </a:prstGeom>
         </p:spPr>
       </p:pic>
+      <p:sp>
+        <p:nvSpPr>
+          <p:cNvPr id="41" name="CuadroTexto 40">
+            <a:extLst>
+              <a:ext uri="{FF2B5EF4-FFF2-40B4-BE49-F238E27FC236}">
+                <a16:creationId xmlns:a16="http://schemas.microsoft.com/office/drawing/2014/main" id="{301523C9-2306-42CE-A5CE-73E53039C7C0}"/>
+              </a:ext>
+            </a:extLst>
+          </p:cNvPr>
+          <p:cNvSpPr txBox="1"/>
+          <p:nvPr/>
+        </p:nvSpPr>
+        <p:spPr>
+          <a:xfrm>
+            <a:off x="2049100" y="6183873"/>
+            <a:ext cx="8341077" cy="369332"/>
+          </a:xfrm>
+          <a:prstGeom prst="rect">
+            <a:avLst/>
+          </a:prstGeom>
+          <a:noFill/>
+        </p:spPr>
+        <p:txBody>
+          <a:bodyPr wrap="square" rtlCol="0">
+            <a:spAutoFit/>
+          </a:bodyPr>
+          <a:lstStyle/>
+          <a:p>
+            <a:pPr algn="ctr"/>
+            <a:r>
+              <a:rPr lang="es-CO" dirty="0"/>
+              <a:t>https://github.com/huertas-santiago/WebWuky</a:t>
+            </a:r>
+          </a:p>
+        </p:txBody>
+      </p:sp>
     </p:spTree>
     <p:extLst>
       <p:ext uri="{BB962C8B-B14F-4D97-AF65-F5344CB8AC3E}">

</xml_diff>